<commit_message>
use phrase ppt template without prep phrase
</commit_message>
<xml_diff>
--- a/linguappt/es/templates/vocab_spanish_classic.pptx
+++ b/linguappt/es/templates/vocab_spanish_classic.pptx
@@ -197,7 +197,7 @@
           <a:p>
             <a:fld id="{49827307-2D32-1C49-A664-3E09AADAF8D1}" type="datetimeFigureOut">
               <a:rPr lang="en-CN" smtClean="0"/>
-              <a:t>4/2/21</a:t>
+              <a:t>2021/9/21</a:t>
             </a:fld>
             <a:endParaRPr lang="en-CN"/>
           </a:p>
@@ -4539,7 +4539,7 @@
 
 <file path=ppt/slideLayouts/slideLayout2.xml><?xml version="1.0" encoding="utf-8"?>
 <p:sldLayout xmlns:a="http://schemas.openxmlformats.org/drawingml/2006/main" xmlns:r="http://schemas.openxmlformats.org/officeDocument/2006/relationships" xmlns:p="http://schemas.openxmlformats.org/presentationml/2006/main" preserve="1" userDrawn="1">
-  <p:cSld name="Opening for english">
+  <p:cSld name="Opening for spanish">
     <p:bg>
       <p:bgPr>
         <a:solidFill>

</xml_diff>